<commit_message>
some improvements to the new-style class discussion
</commit_message>
<xml_diff>
--- a/semaine7/CO12AL-W7-VIDEO03-SLIDE01.pptx
+++ b/semaine7/CO12AL-W7-VIDEO03-SLIDE01.pptx
@@ -5,10 +5,10 @@
     <p:sldMasterId id="2147483649" r:id="rId1"/>
   </p:sldMasterIdLst>
   <p:notesMasterIdLst>
-    <p:notesMasterId r:id="rId14"/>
+    <p:notesMasterId r:id="rId16"/>
   </p:notesMasterIdLst>
   <p:handoutMasterIdLst>
-    <p:handoutMasterId r:id="rId15"/>
+    <p:handoutMasterId r:id="rId17"/>
   </p:handoutMasterIdLst>
   <p:sldIdLst>
     <p:sldId id="256" r:id="rId2"/>
@@ -21,8 +21,10 @@
     <p:sldId id="268" r:id="rId9"/>
     <p:sldId id="269" r:id="rId10"/>
     <p:sldId id="270" r:id="rId11"/>
-    <p:sldId id="272" r:id="rId12"/>
-    <p:sldId id="271" r:id="rId13"/>
+    <p:sldId id="275" r:id="rId12"/>
+    <p:sldId id="276" r:id="rId13"/>
+    <p:sldId id="272" r:id="rId14"/>
+    <p:sldId id="271" r:id="rId15"/>
   </p:sldIdLst>
   <p:sldSz cx="12192000" cy="6858000"/>
   <p:notesSz cx="7099300" cy="10234613"/>
@@ -166,6 +168,8 @@
             <p14:sldId id="268"/>
             <p14:sldId id="269"/>
             <p14:sldId id="270"/>
+            <p14:sldId id="275"/>
+            <p14:sldId id="276"/>
             <p14:sldId id="272"/>
             <p14:sldId id="271"/>
           </p14:sldIdLst>
@@ -1021,6 +1025,815 @@
 </p:notes>
 </file>
 
+<file path=ppt/notesSlides/notesSlide10.xml><?xml version="1.0" encoding="utf-8"?>
+<p:notes xmlns:a="http://schemas.openxmlformats.org/drawingml/2006/main" xmlns:r="http://schemas.openxmlformats.org/officeDocument/2006/relationships" xmlns:p="http://schemas.openxmlformats.org/presentationml/2006/main">
+  <p:cSld>
+    <p:spTree>
+      <p:nvGrpSpPr>
+        <p:cNvPr id="1" name=""/>
+        <p:cNvGrpSpPr/>
+        <p:nvPr/>
+      </p:nvGrpSpPr>
+      <p:grpSpPr>
+        <a:xfrm>
+          <a:off x="0" y="0"/>
+          <a:ext cx="0" cy="0"/>
+          <a:chOff x="0" y="0"/>
+          <a:chExt cx="0" cy="0"/>
+        </a:xfrm>
+      </p:grpSpPr>
+      <p:sp>
+        <p:nvSpPr>
+          <p:cNvPr id="2" name="Espace réservé de l'image des diapositives 1"/>
+          <p:cNvSpPr>
+            <a:spLocks noGrp="1" noRot="1" noChangeAspect="1"/>
+          </p:cNvSpPr>
+          <p:nvPr>
+            <p:ph type="sldImg"/>
+          </p:nvPr>
+        </p:nvSpPr>
+        <p:spPr/>
+      </p:sp>
+      <p:sp>
+        <p:nvSpPr>
+          <p:cNvPr id="3" name="Espace réservé des commentaires 2"/>
+          <p:cNvSpPr>
+            <a:spLocks noGrp="1"/>
+          </p:cNvSpPr>
+          <p:nvPr>
+            <p:ph type="body" idx="1"/>
+          </p:nvPr>
+        </p:nvSpPr>
+        <p:spPr/>
+        <p:txBody>
+          <a:bodyPr/>
+          <a:lstStyle/>
+          <a:p>
+            <a:pPr marL="0" marR="0" indent="0" algn="l" defTabSz="914400" rtl="0" eaLnBrk="0" fontAlgn="base" latinLnBrk="0" hangingPunct="0">
+              <a:lnSpc>
+                <a:spcPct val="100000"/>
+              </a:lnSpc>
+              <a:spcBef>
+                <a:spcPct val="30000"/>
+              </a:spcBef>
+              <a:spcAft>
+                <a:spcPct val="0"/>
+              </a:spcAft>
+              <a:buClrTx/>
+              <a:buSzTx/>
+              <a:buFontTx/>
+              <a:buNone/>
+              <a:tabLst/>
+              <a:defRPr/>
+            </a:pPr>
+            <a:r>
+              <a:rPr lang="fr-FR" dirty="0" smtClean="0"/>
+              <a:t>Attention</a:t>
+            </a:r>
+            <a:r>
+              <a:rPr lang="fr-FR" baseline="0" dirty="0" smtClean="0"/>
+              <a:t> à la terminologie. Tous les objets sont des instances de quelque chose, en particulier les classes sont des instances de la </a:t>
+            </a:r>
+            <a:r>
+              <a:rPr lang="fr-FR" baseline="0" dirty="0" err="1" smtClean="0"/>
+              <a:t>metaclasse</a:t>
+            </a:r>
+            <a:r>
+              <a:rPr lang="fr-FR" baseline="0" dirty="0" smtClean="0"/>
+              <a:t>, mais dans notre contexte on réserve le terme instance à des objets qui n’ont pas pour type l’objet type. On appelle ici les instance de la </a:t>
+            </a:r>
+            <a:r>
+              <a:rPr lang="fr-FR" baseline="0" dirty="0" err="1" smtClean="0"/>
+              <a:t>metaclase</a:t>
+            </a:r>
+            <a:r>
+              <a:rPr lang="fr-FR" baseline="0" dirty="0" smtClean="0"/>
+              <a:t> des classes ou des types (les deux termes sont équivalents). </a:t>
+            </a:r>
+          </a:p>
+          <a:p>
+            <a:pPr marL="0" marR="0" indent="0" algn="l" defTabSz="914400" rtl="0" eaLnBrk="0" fontAlgn="base" latinLnBrk="0" hangingPunct="0">
+              <a:lnSpc>
+                <a:spcPct val="100000"/>
+              </a:lnSpc>
+              <a:spcBef>
+                <a:spcPct val="30000"/>
+              </a:spcBef>
+              <a:spcAft>
+                <a:spcPct val="0"/>
+              </a:spcAft>
+              <a:buClrTx/>
+              <a:buSzTx/>
+              <a:buFontTx/>
+              <a:buNone/>
+              <a:tabLst/>
+              <a:defRPr/>
+            </a:pPr>
+            <a:endParaRPr lang="fr-FR" baseline="0" dirty="0" smtClean="0"/>
+          </a:p>
+          <a:p>
+            <a:pPr marL="0" marR="0" indent="0" algn="l" defTabSz="914400" rtl="0" eaLnBrk="0" fontAlgn="base" latinLnBrk="0" hangingPunct="0">
+              <a:lnSpc>
+                <a:spcPct val="100000"/>
+              </a:lnSpc>
+              <a:spcBef>
+                <a:spcPct val="30000"/>
+              </a:spcBef>
+              <a:spcAft>
+                <a:spcPct val="0"/>
+              </a:spcAft>
+              <a:buClrTx/>
+              <a:buSzTx/>
+              <a:buFontTx/>
+              <a:buNone/>
+              <a:tabLst/>
+              <a:defRPr/>
+            </a:pPr>
+            <a:r>
+              <a:rPr lang="fr-FR" baseline="0" dirty="0" smtClean="0"/>
+              <a:t>Certains </a:t>
+            </a:r>
+            <a:r>
+              <a:rPr lang="fr-FR" baseline="0" dirty="0" err="1" smtClean="0"/>
+              <a:t>built</a:t>
+            </a:r>
+            <a:r>
+              <a:rPr lang="fr-FR" baseline="0" dirty="0" smtClean="0"/>
+              <a:t>-in type ne peuvent pas être des super classes comme </a:t>
+            </a:r>
+            <a:r>
+              <a:rPr lang="fr-FR" baseline="0" dirty="0" err="1" smtClean="0"/>
+              <a:t>FunctionType</a:t>
+            </a:r>
+            <a:r>
+              <a:rPr lang="fr-FR" baseline="0" dirty="0" smtClean="0"/>
+              <a:t> (la raison n’est pas claire pour moi, peut-être est-ce lié</a:t>
+            </a:r>
+          </a:p>
+          <a:p>
+            <a:pPr marL="0" marR="0" indent="0" algn="l" defTabSz="914400" rtl="0" eaLnBrk="0" fontAlgn="base" latinLnBrk="0" hangingPunct="0">
+              <a:lnSpc>
+                <a:spcPct val="100000"/>
+              </a:lnSpc>
+              <a:spcBef>
+                <a:spcPct val="30000"/>
+              </a:spcBef>
+              <a:spcAft>
+                <a:spcPct val="0"/>
+              </a:spcAft>
+              <a:buClrTx/>
+              <a:buSzTx/>
+              <a:buFontTx/>
+              <a:buNone/>
+              <a:tabLst/>
+              <a:defRPr/>
+            </a:pPr>
+            <a:r>
+              <a:rPr lang="fr-FR" baseline="0" dirty="0" smtClean="0"/>
+              <a:t>Rôle très particulier des fonctions).</a:t>
+            </a:r>
+          </a:p>
+          <a:p>
+            <a:pPr marL="0" marR="0" indent="0" algn="l" defTabSz="914400" rtl="0" eaLnBrk="0" fontAlgn="base" latinLnBrk="0" hangingPunct="0">
+              <a:lnSpc>
+                <a:spcPct val="100000"/>
+              </a:lnSpc>
+              <a:spcBef>
+                <a:spcPct val="30000"/>
+              </a:spcBef>
+              <a:spcAft>
+                <a:spcPct val="0"/>
+              </a:spcAft>
+              <a:buClrTx/>
+              <a:buSzTx/>
+              <a:buFontTx/>
+              <a:buNone/>
+              <a:tabLst/>
+              <a:defRPr/>
+            </a:pPr>
+            <a:r>
+              <a:rPr lang="fr-FR" dirty="0" smtClean="0"/>
+              <a:t>&gt;&gt;&gt; import types</a:t>
+            </a:r>
+          </a:p>
+          <a:p>
+            <a:pPr marL="0" marR="0" indent="0" algn="l" defTabSz="914400" rtl="0" eaLnBrk="0" fontAlgn="base" latinLnBrk="0" hangingPunct="0">
+              <a:lnSpc>
+                <a:spcPct val="100000"/>
+              </a:lnSpc>
+              <a:spcBef>
+                <a:spcPct val="30000"/>
+              </a:spcBef>
+              <a:spcAft>
+                <a:spcPct val="0"/>
+              </a:spcAft>
+              <a:buClrTx/>
+              <a:buSzTx/>
+              <a:buFontTx/>
+              <a:buNone/>
+              <a:tabLst/>
+              <a:defRPr/>
+            </a:pPr>
+            <a:r>
+              <a:rPr lang="fr-FR" dirty="0" smtClean="0"/>
+              <a:t>&gt;&gt;&gt; type(</a:t>
+            </a:r>
+            <a:r>
+              <a:rPr lang="fr-FR" dirty="0" err="1" smtClean="0"/>
+              <a:t>types.FunctionType</a:t>
+            </a:r>
+            <a:r>
+              <a:rPr lang="fr-FR" dirty="0" smtClean="0"/>
+              <a:t>)</a:t>
+            </a:r>
+          </a:p>
+          <a:p>
+            <a:pPr marL="0" marR="0" indent="0" algn="l" defTabSz="914400" rtl="0" eaLnBrk="0" fontAlgn="base" latinLnBrk="0" hangingPunct="0">
+              <a:lnSpc>
+                <a:spcPct val="100000"/>
+              </a:lnSpc>
+              <a:spcBef>
+                <a:spcPct val="30000"/>
+              </a:spcBef>
+              <a:spcAft>
+                <a:spcPct val="0"/>
+              </a:spcAft>
+              <a:buClrTx/>
+              <a:buSzTx/>
+              <a:buFontTx/>
+              <a:buNone/>
+              <a:tabLst/>
+              <a:defRPr/>
+            </a:pPr>
+            <a:r>
+              <a:rPr lang="fr-FR" dirty="0" smtClean="0"/>
+              <a:t>&lt;type 'type'&gt;</a:t>
+            </a:r>
+          </a:p>
+          <a:p>
+            <a:pPr marL="0" marR="0" indent="0" algn="l" defTabSz="914400" rtl="0" eaLnBrk="0" fontAlgn="base" latinLnBrk="0" hangingPunct="0">
+              <a:lnSpc>
+                <a:spcPct val="100000"/>
+              </a:lnSpc>
+              <a:spcBef>
+                <a:spcPct val="30000"/>
+              </a:spcBef>
+              <a:spcAft>
+                <a:spcPct val="0"/>
+              </a:spcAft>
+              <a:buClrTx/>
+              <a:buSzTx/>
+              <a:buFontTx/>
+              <a:buNone/>
+              <a:tabLst/>
+              <a:defRPr/>
+            </a:pPr>
+            <a:r>
+              <a:rPr lang="fr-FR" dirty="0" smtClean="0"/>
+              <a:t>&gt;&gt;&gt; class C(</a:t>
+            </a:r>
+            <a:r>
+              <a:rPr lang="fr-FR" dirty="0" err="1" smtClean="0"/>
+              <a:t>types.FunctionType</a:t>
+            </a:r>
+            <a:r>
+              <a:rPr lang="fr-FR" dirty="0" smtClean="0"/>
+              <a:t>):</a:t>
+            </a:r>
+          </a:p>
+          <a:p>
+            <a:pPr marL="0" marR="0" indent="0" algn="l" defTabSz="914400" rtl="0" eaLnBrk="0" fontAlgn="base" latinLnBrk="0" hangingPunct="0">
+              <a:lnSpc>
+                <a:spcPct val="100000"/>
+              </a:lnSpc>
+              <a:spcBef>
+                <a:spcPct val="30000"/>
+              </a:spcBef>
+              <a:spcAft>
+                <a:spcPct val="0"/>
+              </a:spcAft>
+              <a:buClrTx/>
+              <a:buSzTx/>
+              <a:buFontTx/>
+              <a:buNone/>
+              <a:tabLst/>
+              <a:defRPr/>
+            </a:pPr>
+            <a:r>
+              <a:rPr lang="fr-FR" dirty="0" smtClean="0"/>
+              <a:t>	</a:t>
+            </a:r>
+            <a:r>
+              <a:rPr lang="fr-FR" dirty="0" err="1" smtClean="0"/>
+              <a:t>pass</a:t>
+            </a:r>
+            <a:endParaRPr lang="fr-FR" dirty="0" smtClean="0"/>
+          </a:p>
+          <a:p>
+            <a:pPr marL="0" marR="0" indent="0" algn="l" defTabSz="914400" rtl="0" eaLnBrk="0" fontAlgn="base" latinLnBrk="0" hangingPunct="0">
+              <a:lnSpc>
+                <a:spcPct val="100000"/>
+              </a:lnSpc>
+              <a:spcBef>
+                <a:spcPct val="30000"/>
+              </a:spcBef>
+              <a:spcAft>
+                <a:spcPct val="0"/>
+              </a:spcAft>
+              <a:buClrTx/>
+              <a:buSzTx/>
+              <a:buFontTx/>
+              <a:buNone/>
+              <a:tabLst/>
+              <a:defRPr/>
+            </a:pPr>
+            <a:endParaRPr lang="fr-FR" dirty="0" smtClean="0"/>
+          </a:p>
+          <a:p>
+            <a:pPr marL="0" marR="0" indent="0" algn="l" defTabSz="914400" rtl="0" eaLnBrk="0" fontAlgn="base" latinLnBrk="0" hangingPunct="0">
+              <a:lnSpc>
+                <a:spcPct val="100000"/>
+              </a:lnSpc>
+              <a:spcBef>
+                <a:spcPct val="30000"/>
+              </a:spcBef>
+              <a:spcAft>
+                <a:spcPct val="0"/>
+              </a:spcAft>
+              <a:buClrTx/>
+              <a:buSzTx/>
+              <a:buFontTx/>
+              <a:buNone/>
+              <a:tabLst/>
+              <a:defRPr/>
+            </a:pPr>
+            <a:r>
+              <a:rPr lang="fr-FR" dirty="0" err="1" smtClean="0"/>
+              <a:t>Traceback</a:t>
+            </a:r>
+            <a:r>
+              <a:rPr lang="fr-FR" dirty="0" smtClean="0"/>
+              <a:t> (</a:t>
+            </a:r>
+            <a:r>
+              <a:rPr lang="fr-FR" dirty="0" err="1" smtClean="0"/>
+              <a:t>most</a:t>
+            </a:r>
+            <a:r>
+              <a:rPr lang="fr-FR" dirty="0" smtClean="0"/>
+              <a:t> </a:t>
+            </a:r>
+            <a:r>
+              <a:rPr lang="fr-FR" dirty="0" err="1" smtClean="0"/>
+              <a:t>recent</a:t>
+            </a:r>
+            <a:r>
+              <a:rPr lang="fr-FR" dirty="0" smtClean="0"/>
+              <a:t> call last):</a:t>
+            </a:r>
+          </a:p>
+          <a:p>
+            <a:pPr marL="0" marR="0" indent="0" algn="l" defTabSz="914400" rtl="0" eaLnBrk="0" fontAlgn="base" latinLnBrk="0" hangingPunct="0">
+              <a:lnSpc>
+                <a:spcPct val="100000"/>
+              </a:lnSpc>
+              <a:spcBef>
+                <a:spcPct val="30000"/>
+              </a:spcBef>
+              <a:spcAft>
+                <a:spcPct val="0"/>
+              </a:spcAft>
+              <a:buClrTx/>
+              <a:buSzTx/>
+              <a:buFontTx/>
+              <a:buNone/>
+              <a:tabLst/>
+              <a:defRPr/>
+            </a:pPr>
+            <a:r>
+              <a:rPr lang="fr-FR" dirty="0" smtClean="0"/>
+              <a:t>  File "&lt;pyshell#74&gt;", line 1, in &lt;module&gt;</a:t>
+            </a:r>
+          </a:p>
+          <a:p>
+            <a:pPr marL="0" marR="0" indent="0" algn="l" defTabSz="914400" rtl="0" eaLnBrk="0" fontAlgn="base" latinLnBrk="0" hangingPunct="0">
+              <a:lnSpc>
+                <a:spcPct val="100000"/>
+              </a:lnSpc>
+              <a:spcBef>
+                <a:spcPct val="30000"/>
+              </a:spcBef>
+              <a:spcAft>
+                <a:spcPct val="0"/>
+              </a:spcAft>
+              <a:buClrTx/>
+              <a:buSzTx/>
+              <a:buFontTx/>
+              <a:buNone/>
+              <a:tabLst/>
+              <a:defRPr/>
+            </a:pPr>
+            <a:r>
+              <a:rPr lang="fr-FR" dirty="0" smtClean="0"/>
+              <a:t>    class C(</a:t>
+            </a:r>
+            <a:r>
+              <a:rPr lang="fr-FR" dirty="0" err="1" smtClean="0"/>
+              <a:t>types.FunctionType</a:t>
+            </a:r>
+            <a:r>
+              <a:rPr lang="fr-FR" dirty="0" smtClean="0"/>
+              <a:t>):</a:t>
+            </a:r>
+          </a:p>
+          <a:p>
+            <a:pPr marL="0" marR="0" indent="0" algn="l" defTabSz="914400" rtl="0" eaLnBrk="0" fontAlgn="base" latinLnBrk="0" hangingPunct="0">
+              <a:lnSpc>
+                <a:spcPct val="100000"/>
+              </a:lnSpc>
+              <a:spcBef>
+                <a:spcPct val="30000"/>
+              </a:spcBef>
+              <a:spcAft>
+                <a:spcPct val="0"/>
+              </a:spcAft>
+              <a:buClrTx/>
+              <a:buSzTx/>
+              <a:buFontTx/>
+              <a:buNone/>
+              <a:tabLst/>
+              <a:defRPr/>
+            </a:pPr>
+            <a:r>
+              <a:rPr lang="fr-FR" dirty="0" err="1" smtClean="0"/>
+              <a:t>TypeError</a:t>
+            </a:r>
+            <a:r>
+              <a:rPr lang="fr-FR" dirty="0" smtClean="0"/>
+              <a:t>: </a:t>
+            </a:r>
+            <a:r>
+              <a:rPr lang="fr-FR" dirty="0" err="1" smtClean="0"/>
+              <a:t>Error</a:t>
+            </a:r>
+            <a:r>
+              <a:rPr lang="fr-FR" dirty="0" smtClean="0"/>
+              <a:t> </a:t>
+            </a:r>
+            <a:r>
+              <a:rPr lang="fr-FR" dirty="0" err="1" smtClean="0"/>
+              <a:t>when</a:t>
+            </a:r>
+            <a:r>
+              <a:rPr lang="fr-FR" dirty="0" smtClean="0"/>
+              <a:t> </a:t>
+            </a:r>
+            <a:r>
+              <a:rPr lang="fr-FR" dirty="0" err="1" smtClean="0"/>
+              <a:t>calling</a:t>
+            </a:r>
+            <a:r>
+              <a:rPr lang="fr-FR" dirty="0" smtClean="0"/>
+              <a:t> the </a:t>
+            </a:r>
+            <a:r>
+              <a:rPr lang="fr-FR" dirty="0" err="1" smtClean="0"/>
+              <a:t>metaclass</a:t>
+            </a:r>
+            <a:r>
+              <a:rPr lang="fr-FR" dirty="0" smtClean="0"/>
+              <a:t> bases</a:t>
+            </a:r>
+          </a:p>
+          <a:p>
+            <a:pPr marL="0" marR="0" indent="0" algn="l" defTabSz="914400" rtl="0" eaLnBrk="0" fontAlgn="base" latinLnBrk="0" hangingPunct="0">
+              <a:lnSpc>
+                <a:spcPct val="100000"/>
+              </a:lnSpc>
+              <a:spcBef>
+                <a:spcPct val="30000"/>
+              </a:spcBef>
+              <a:spcAft>
+                <a:spcPct val="0"/>
+              </a:spcAft>
+              <a:buClrTx/>
+              <a:buSzTx/>
+              <a:buFontTx/>
+              <a:buNone/>
+              <a:tabLst/>
+              <a:defRPr/>
+            </a:pPr>
+            <a:r>
+              <a:rPr lang="fr-FR" dirty="0" smtClean="0"/>
+              <a:t>    type '</a:t>
+            </a:r>
+            <a:r>
+              <a:rPr lang="fr-FR" dirty="0" err="1" smtClean="0"/>
+              <a:t>function</a:t>
+            </a:r>
+            <a:r>
+              <a:rPr lang="fr-FR" dirty="0" smtClean="0"/>
+              <a:t>' </a:t>
+            </a:r>
+            <a:r>
+              <a:rPr lang="fr-FR" dirty="0" err="1" smtClean="0"/>
+              <a:t>is</a:t>
+            </a:r>
+            <a:r>
+              <a:rPr lang="fr-FR" dirty="0" smtClean="0"/>
+              <a:t> not an acceptable base type</a:t>
+            </a:r>
+          </a:p>
+          <a:p>
+            <a:endParaRPr lang="fr-FR" dirty="0"/>
+          </a:p>
+        </p:txBody>
+      </p:sp>
+      <p:sp>
+        <p:nvSpPr>
+          <p:cNvPr id="4" name="Espace réservé du numéro de diapositive 3"/>
+          <p:cNvSpPr>
+            <a:spLocks noGrp="1"/>
+          </p:cNvSpPr>
+          <p:nvPr>
+            <p:ph type="sldNum" sz="quarter" idx="10"/>
+          </p:nvPr>
+        </p:nvSpPr>
+        <p:spPr/>
+        <p:txBody>
+          <a:bodyPr/>
+          <a:lstStyle/>
+          <a:p>
+            <a:pPr>
+              <a:defRPr/>
+            </a:pPr>
+            <a:fld id="{9E8EB9F5-F2F7-4A48-A943-9B409357C15C}" type="slidenum">
+              <a:rPr lang="en-US" smtClean="0"/>
+              <a:pPr>
+                <a:defRPr/>
+              </a:pPr>
+              <a:t>12</a:t>
+            </a:fld>
+            <a:endParaRPr lang="en-US"/>
+          </a:p>
+        </p:txBody>
+      </p:sp>
+    </p:spTree>
+    <p:extLst>
+      <p:ext uri="{BB962C8B-B14F-4D97-AF65-F5344CB8AC3E}">
+        <p14:creationId xmlns:p14="http://schemas.microsoft.com/office/powerpoint/2010/main" val="3918877288"/>
+      </p:ext>
+    </p:extLst>
+  </p:cSld>
+  <p:clrMapOvr>
+    <a:masterClrMapping/>
+  </p:clrMapOvr>
+</p:notes>
+</file>
+
+<file path=ppt/notesSlides/notesSlide11.xml><?xml version="1.0" encoding="utf-8"?>
+<p:notes xmlns:a="http://schemas.openxmlformats.org/drawingml/2006/main" xmlns:r="http://schemas.openxmlformats.org/officeDocument/2006/relationships" xmlns:p="http://schemas.openxmlformats.org/presentationml/2006/main">
+  <p:cSld>
+    <p:spTree>
+      <p:nvGrpSpPr>
+        <p:cNvPr id="1" name=""/>
+        <p:cNvGrpSpPr/>
+        <p:nvPr/>
+      </p:nvGrpSpPr>
+      <p:grpSpPr>
+        <a:xfrm>
+          <a:off x="0" y="0"/>
+          <a:ext cx="0" cy="0"/>
+          <a:chOff x="0" y="0"/>
+          <a:chExt cx="0" cy="0"/>
+        </a:xfrm>
+      </p:grpSpPr>
+      <p:sp>
+        <p:nvSpPr>
+          <p:cNvPr id="2" name="Espace réservé de l'image des diapositives 1"/>
+          <p:cNvSpPr>
+            <a:spLocks noGrp="1" noRot="1" noChangeAspect="1"/>
+          </p:cNvSpPr>
+          <p:nvPr>
+            <p:ph type="sldImg"/>
+          </p:nvPr>
+        </p:nvSpPr>
+        <p:spPr/>
+      </p:sp>
+      <p:sp>
+        <p:nvSpPr>
+          <p:cNvPr id="3" name="Espace réservé des commentaires 2"/>
+          <p:cNvSpPr>
+            <a:spLocks noGrp="1"/>
+          </p:cNvSpPr>
+          <p:nvPr>
+            <p:ph type="body" idx="1"/>
+          </p:nvPr>
+        </p:nvSpPr>
+        <p:spPr/>
+        <p:txBody>
+          <a:bodyPr/>
+          <a:lstStyle/>
+          <a:p>
+            <a:r>
+              <a:rPr lang="fr-FR" dirty="0" smtClean="0"/>
+              <a:t>Type est la </a:t>
+            </a:r>
+            <a:r>
+              <a:rPr lang="fr-FR" dirty="0" err="1" smtClean="0"/>
+              <a:t>métaclasse</a:t>
+            </a:r>
+            <a:r>
+              <a:rPr lang="fr-FR" baseline="0" dirty="0" smtClean="0"/>
+              <a:t> pour type. Ça n’est évidement pas type qui instancie type, ça n’aurait pas de sens puisque type doit exister à un moment et ne peut pas être</a:t>
+            </a:r>
+          </a:p>
+          <a:p>
+            <a:r>
+              <a:rPr lang="fr-FR" baseline="0" dirty="0" smtClean="0"/>
+              <a:t>Une génération </a:t>
+            </a:r>
+            <a:r>
+              <a:rPr lang="fr-FR" baseline="0" dirty="0" err="1" smtClean="0"/>
+              <a:t>spontannée</a:t>
+            </a:r>
+            <a:r>
+              <a:rPr lang="fr-FR" baseline="0" dirty="0" smtClean="0"/>
+              <a:t>. L’objet type est le premier créé par l’interpréteur Python. Le fait que type(type) retourne type est simplement une astuce pour n’avoir qu’un seul niveau de </a:t>
+            </a:r>
+            <a:r>
+              <a:rPr lang="fr-FR" baseline="0" dirty="0" err="1" smtClean="0"/>
+              <a:t>metaclasses</a:t>
+            </a:r>
+            <a:r>
+              <a:rPr lang="fr-FR" baseline="0" dirty="0" smtClean="0"/>
+              <a:t>. Si ça n’était pas le cas, il faudrait une autre </a:t>
+            </a:r>
+            <a:r>
+              <a:rPr lang="fr-FR" baseline="0" dirty="0" err="1" smtClean="0"/>
+              <a:t>métaclasse</a:t>
+            </a:r>
+            <a:r>
+              <a:rPr lang="fr-FR" baseline="0" dirty="0" smtClean="0"/>
+              <a:t> pour type, et une autre </a:t>
+            </a:r>
+            <a:r>
+              <a:rPr lang="fr-FR" baseline="0" dirty="0" err="1" smtClean="0"/>
+              <a:t>métaclasse</a:t>
+            </a:r>
+            <a:r>
+              <a:rPr lang="fr-FR" baseline="0" dirty="0" smtClean="0"/>
+              <a:t> pour la </a:t>
+            </a:r>
+            <a:r>
+              <a:rPr lang="fr-FR" baseline="0" dirty="0" err="1" smtClean="0"/>
+              <a:t>métaclasse</a:t>
+            </a:r>
+            <a:r>
+              <a:rPr lang="fr-FR" baseline="0" dirty="0" smtClean="0"/>
+              <a:t> de type, et ainsi de suite. </a:t>
+            </a:r>
+            <a:endParaRPr lang="fr-FR" baseline="0" dirty="0" smtClean="0"/>
+          </a:p>
+          <a:p>
+            <a:endParaRPr lang="fr-FR" baseline="0" dirty="0" smtClean="0"/>
+          </a:p>
+          <a:p>
+            <a:r>
+              <a:rPr lang="fr-FR" baseline="0" dirty="0" smtClean="0"/>
+              <a:t>Quelques résultats étonnants à première vue</a:t>
+            </a:r>
+          </a:p>
+          <a:p>
+            <a:r>
+              <a:rPr lang="fr-FR" dirty="0" smtClean="0"/>
+              <a:t>&gt;&gt;&gt; </a:t>
+            </a:r>
+            <a:r>
+              <a:rPr lang="fr-FR" dirty="0" err="1" smtClean="0"/>
+              <a:t>isinstance</a:t>
+            </a:r>
+            <a:r>
+              <a:rPr lang="fr-FR" dirty="0" smtClean="0"/>
+              <a:t>(</a:t>
+            </a:r>
+            <a:r>
+              <a:rPr lang="fr-FR" dirty="0" err="1" smtClean="0"/>
+              <a:t>object</a:t>
+            </a:r>
+            <a:r>
+              <a:rPr lang="fr-FR" dirty="0" smtClean="0"/>
+              <a:t>, </a:t>
+            </a:r>
+            <a:r>
+              <a:rPr lang="fr-FR" dirty="0" err="1" smtClean="0"/>
+              <a:t>object</a:t>
+            </a:r>
+            <a:r>
+              <a:rPr lang="fr-FR" dirty="0" smtClean="0"/>
+              <a:t>)</a:t>
+            </a:r>
+          </a:p>
+          <a:p>
+            <a:r>
+              <a:rPr lang="fr-FR" dirty="0" err="1" smtClean="0"/>
+              <a:t>True</a:t>
+            </a:r>
+            <a:endParaRPr lang="fr-FR" dirty="0" smtClean="0"/>
+          </a:p>
+          <a:p>
+            <a:r>
+              <a:rPr lang="fr-FR" dirty="0" smtClean="0"/>
+              <a:t>&gt;&gt;&gt; </a:t>
+            </a:r>
+            <a:r>
+              <a:rPr lang="fr-FR" dirty="0" err="1" smtClean="0"/>
+              <a:t>isinstance</a:t>
+            </a:r>
+            <a:r>
+              <a:rPr lang="fr-FR" dirty="0" smtClean="0"/>
+              <a:t>(type, </a:t>
+            </a:r>
+            <a:r>
+              <a:rPr lang="fr-FR" dirty="0" err="1" smtClean="0"/>
+              <a:t>object</a:t>
+            </a:r>
+            <a:r>
+              <a:rPr lang="fr-FR" dirty="0" smtClean="0"/>
+              <a:t>)</a:t>
+            </a:r>
+          </a:p>
+          <a:p>
+            <a:r>
+              <a:rPr lang="fr-FR" dirty="0" err="1" smtClean="0"/>
+              <a:t>True</a:t>
+            </a:r>
+            <a:endParaRPr lang="fr-FR" dirty="0" smtClean="0"/>
+          </a:p>
+          <a:p>
+            <a:endParaRPr lang="fr-FR" dirty="0" smtClean="0"/>
+          </a:p>
+          <a:p>
+            <a:r>
+              <a:rPr lang="fr-FR" dirty="0" smtClean="0"/>
+              <a:t>objet est une instance</a:t>
+            </a:r>
+            <a:r>
+              <a:rPr lang="fr-FR" baseline="0" dirty="0" smtClean="0"/>
+              <a:t> d’objet parce que objet est une instance de type et objet est une super classe de type (relation de transitivité)</a:t>
+            </a:r>
+          </a:p>
+          <a:p>
+            <a:r>
+              <a:rPr lang="fr-FR" baseline="0" dirty="0" smtClean="0"/>
+              <a:t>type est une instance d’objet parce que parce que type est une instance de type et objet est une super classe de type (relation de transitivité)</a:t>
+            </a:r>
+            <a:endParaRPr lang="fr-FR" dirty="0" smtClean="0"/>
+          </a:p>
+        </p:txBody>
+      </p:sp>
+      <p:sp>
+        <p:nvSpPr>
+          <p:cNvPr id="4" name="Espace réservé du numéro de diapositive 3"/>
+          <p:cNvSpPr>
+            <a:spLocks noGrp="1"/>
+          </p:cNvSpPr>
+          <p:nvPr>
+            <p:ph type="sldNum" sz="quarter" idx="10"/>
+          </p:nvPr>
+        </p:nvSpPr>
+        <p:spPr/>
+        <p:txBody>
+          <a:bodyPr/>
+          <a:lstStyle/>
+          <a:p>
+            <a:pPr>
+              <a:defRPr/>
+            </a:pPr>
+            <a:fld id="{9E8EB9F5-F2F7-4A48-A943-9B409357C15C}" type="slidenum">
+              <a:rPr lang="en-US" smtClean="0"/>
+              <a:pPr>
+                <a:defRPr/>
+              </a:pPr>
+              <a:t>14</a:t>
+            </a:fld>
+            <a:endParaRPr lang="en-US"/>
+          </a:p>
+        </p:txBody>
+      </p:sp>
+    </p:spTree>
+    <p:extLst>
+      <p:ext uri="{BB962C8B-B14F-4D97-AF65-F5344CB8AC3E}">
+        <p14:creationId xmlns:p14="http://schemas.microsoft.com/office/powerpoint/2010/main" val="3107066879"/>
+      </p:ext>
+    </p:extLst>
+  </p:cSld>
+  <p:clrMapOvr>
+    <a:masterClrMapping/>
+  </p:clrMapOvr>
+</p:notes>
+</file>
+
 <file path=ppt/notesSlides/notesSlide2.xml><?xml version="1.0" encoding="utf-8"?>
 <p:notes xmlns:a="http://schemas.openxmlformats.org/drawingml/2006/main" xmlns:r="http://schemas.openxmlformats.org/officeDocument/2006/relationships" xmlns:p="http://schemas.openxmlformats.org/presentationml/2006/main">
   <p:cSld>
@@ -1589,8 +2402,27 @@
             </a:r>
             <a:r>
               <a:rPr lang="fr-FR" baseline="0" dirty="0" smtClean="0"/>
-              <a:t> d’une sous classe est toujours type</a:t>
-            </a:r>
+              <a:t> d’une sous classe est toujours </a:t>
+            </a:r>
+            <a:r>
+              <a:rPr lang="fr-FR" baseline="0" dirty="0" smtClean="0"/>
+              <a:t>type si type est le type de la super classe, ce qui est toujours le cas pour les</a:t>
+            </a:r>
+          </a:p>
+          <a:p>
+            <a:r>
+              <a:rPr lang="fr-FR" baseline="0" dirty="0" smtClean="0"/>
+              <a:t>Classes new-style (sauf si on change la </a:t>
+            </a:r>
+            <a:r>
+              <a:rPr lang="fr-FR" baseline="0" dirty="0" err="1" smtClean="0"/>
+              <a:t>meta</a:t>
+            </a:r>
+            <a:r>
+              <a:rPr lang="fr-FR" baseline="0" dirty="0" smtClean="0"/>
+              <a:t> classe, mais on reviendra dessus plus tard)</a:t>
+            </a:r>
+            <a:endParaRPr lang="fr-FR" baseline="0" dirty="0" smtClean="0"/>
           </a:p>
           <a:p>
             <a:r>
@@ -1701,65 +2533,7 @@
           <a:bodyPr/>
           <a:lstStyle/>
           <a:p>
-            <a:r>
-              <a:rPr lang="fr-FR" dirty="0" smtClean="0"/>
-              <a:t>Type est la </a:t>
-            </a:r>
-            <a:r>
-              <a:rPr lang="fr-FR" dirty="0" err="1" smtClean="0"/>
-              <a:t>métaclasse</a:t>
-            </a:r>
-            <a:r>
-              <a:rPr lang="fr-FR" baseline="0" dirty="0" smtClean="0"/>
-              <a:t> pour type. Ça n’est évidement pas type qui instancie type, ça n’aurait pas de sens puisque type doit exister à un moment et ne peut pas être</a:t>
-            </a:r>
-          </a:p>
-          <a:p>
-            <a:r>
-              <a:rPr lang="fr-FR" baseline="0" dirty="0" smtClean="0"/>
-              <a:t>Une génération </a:t>
-            </a:r>
-            <a:r>
-              <a:rPr lang="fr-FR" baseline="0" dirty="0" err="1" smtClean="0"/>
-              <a:t>spontannée</a:t>
-            </a:r>
-            <a:r>
-              <a:rPr lang="fr-FR" baseline="0" dirty="0" smtClean="0"/>
-              <a:t>. L’objet type est le premier créé par l’interpréteur Python. Le fait que type(type) retourne type est simplement une astuce pour n’avoir qu’un seul niveau de </a:t>
-            </a:r>
-            <a:r>
-              <a:rPr lang="fr-FR" baseline="0" dirty="0" err="1" smtClean="0"/>
-              <a:t>metaclasses</a:t>
-            </a:r>
-            <a:r>
-              <a:rPr lang="fr-FR" baseline="0" dirty="0" smtClean="0"/>
-              <a:t>. Si ça n’était pas le cas, il faudrait une autre </a:t>
-            </a:r>
-            <a:r>
-              <a:rPr lang="fr-FR" baseline="0" dirty="0" err="1" smtClean="0"/>
-              <a:t>métaclasse</a:t>
-            </a:r>
-            <a:r>
-              <a:rPr lang="fr-FR" baseline="0" dirty="0" smtClean="0"/>
-              <a:t> pour type, et une autre </a:t>
-            </a:r>
-            <a:r>
-              <a:rPr lang="fr-FR" baseline="0" dirty="0" err="1" smtClean="0"/>
-              <a:t>métaclasse</a:t>
-            </a:r>
-            <a:r>
-              <a:rPr lang="fr-FR" baseline="0" dirty="0" smtClean="0"/>
-              <a:t> pour la </a:t>
-            </a:r>
-            <a:r>
-              <a:rPr lang="fr-FR" baseline="0" dirty="0" err="1" smtClean="0"/>
-              <a:t>métaclasse</a:t>
-            </a:r>
-            <a:r>
-              <a:rPr lang="fr-FR" baseline="0" dirty="0" smtClean="0"/>
-              <a:t> de type, et ainsi de suite. Ça ne s’arrêterait jamais. </a:t>
-            </a:r>
-            <a:endParaRPr lang="fr-FR" dirty="0" smtClean="0"/>
+            <a:endParaRPr lang="fr-FR" dirty="0"/>
           </a:p>
         </p:txBody>
       </p:sp>
@@ -1786,7 +2560,7 @@
               <a:pPr>
                 <a:defRPr/>
               </a:pPr>
-              <a:t>12</a:t>
+              <a:t>10</a:t>
             </a:fld>
             <a:endParaRPr lang="en-US"/>
           </a:p>
@@ -1795,7 +2569,141 @@
     </p:spTree>
     <p:extLst>
       <p:ext uri="{BB962C8B-B14F-4D97-AF65-F5344CB8AC3E}">
-        <p14:creationId xmlns:p14="http://schemas.microsoft.com/office/powerpoint/2010/main" val="3107066879"/>
+        <p14:creationId xmlns:p14="http://schemas.microsoft.com/office/powerpoint/2010/main" val="3392731514"/>
+      </p:ext>
+    </p:extLst>
+  </p:cSld>
+  <p:clrMapOvr>
+    <a:masterClrMapping/>
+  </p:clrMapOvr>
+</p:notes>
+</file>
+
+<file path=ppt/notesSlides/notesSlide9.xml><?xml version="1.0" encoding="utf-8"?>
+<p:notes xmlns:a="http://schemas.openxmlformats.org/drawingml/2006/main" xmlns:r="http://schemas.openxmlformats.org/officeDocument/2006/relationships" xmlns:p="http://schemas.openxmlformats.org/presentationml/2006/main">
+  <p:cSld>
+    <p:spTree>
+      <p:nvGrpSpPr>
+        <p:cNvPr id="1" name=""/>
+        <p:cNvGrpSpPr/>
+        <p:nvPr/>
+      </p:nvGrpSpPr>
+      <p:grpSpPr>
+        <a:xfrm>
+          <a:off x="0" y="0"/>
+          <a:ext cx="0" cy="0"/>
+          <a:chOff x="0" y="0"/>
+          <a:chExt cx="0" cy="0"/>
+        </a:xfrm>
+      </p:grpSpPr>
+      <p:sp>
+        <p:nvSpPr>
+          <p:cNvPr id="2" name="Espace réservé de l'image des diapositives 1"/>
+          <p:cNvSpPr>
+            <a:spLocks noGrp="1" noRot="1" noChangeAspect="1"/>
+          </p:cNvSpPr>
+          <p:nvPr>
+            <p:ph type="sldImg"/>
+          </p:nvPr>
+        </p:nvSpPr>
+        <p:spPr/>
+      </p:sp>
+      <p:sp>
+        <p:nvSpPr>
+          <p:cNvPr id="3" name="Espace réservé des commentaires 2"/>
+          <p:cNvSpPr>
+            <a:spLocks noGrp="1"/>
+          </p:cNvSpPr>
+          <p:nvPr>
+            <p:ph type="body" idx="1"/>
+          </p:nvPr>
+        </p:nvSpPr>
+        <p:spPr/>
+        <p:txBody>
+          <a:bodyPr/>
+          <a:lstStyle/>
+          <a:p>
+            <a:pPr marL="0" marR="0" indent="0" algn="l" defTabSz="914400" rtl="0" eaLnBrk="0" fontAlgn="base" latinLnBrk="0" hangingPunct="0">
+              <a:lnSpc>
+                <a:spcPct val="100000"/>
+              </a:lnSpc>
+              <a:spcBef>
+                <a:spcPct val="30000"/>
+              </a:spcBef>
+              <a:spcAft>
+                <a:spcPct val="0"/>
+              </a:spcAft>
+              <a:buClrTx/>
+              <a:buSzTx/>
+              <a:buFontTx/>
+              <a:buNone/>
+              <a:tabLst/>
+              <a:defRPr/>
+            </a:pPr>
+            <a:r>
+              <a:rPr lang="fr-FR" dirty="0" smtClean="0"/>
+              <a:t>Attention</a:t>
+            </a:r>
+            <a:r>
+              <a:rPr lang="fr-FR" baseline="0" dirty="0" smtClean="0"/>
+              <a:t> à la terminologie. Tous les objets sont des instances de quelque chose, en particulier les classes sont des instances de la </a:t>
+            </a:r>
+            <a:r>
+              <a:rPr lang="fr-FR" baseline="0" dirty="0" err="1" smtClean="0"/>
+              <a:t>metaclasse</a:t>
+            </a:r>
+            <a:r>
+              <a:rPr lang="fr-FR" baseline="0" dirty="0" smtClean="0"/>
+              <a:t>, mais dans notre contexte on réserve le terme instance à des objets qui n’ont pas pour type l’objet type. On appelle ici les instance de la </a:t>
+            </a:r>
+            <a:r>
+              <a:rPr lang="fr-FR" baseline="0" dirty="0" err="1" smtClean="0"/>
+              <a:t>metaclase</a:t>
+            </a:r>
+            <a:r>
+              <a:rPr lang="fr-FR" baseline="0" dirty="0" smtClean="0"/>
+              <a:t> des classes ou des types (les deux termes sont équivalents). </a:t>
+            </a:r>
+            <a:endParaRPr lang="fr-FR" dirty="0" smtClean="0"/>
+          </a:p>
+          <a:p>
+            <a:endParaRPr lang="fr-FR" dirty="0"/>
+          </a:p>
+        </p:txBody>
+      </p:sp>
+      <p:sp>
+        <p:nvSpPr>
+          <p:cNvPr id="4" name="Espace réservé du numéro de diapositive 3"/>
+          <p:cNvSpPr>
+            <a:spLocks noGrp="1"/>
+          </p:cNvSpPr>
+          <p:nvPr>
+            <p:ph type="sldNum" sz="quarter" idx="10"/>
+          </p:nvPr>
+        </p:nvSpPr>
+        <p:spPr/>
+        <p:txBody>
+          <a:bodyPr/>
+          <a:lstStyle/>
+          <a:p>
+            <a:pPr>
+              <a:defRPr/>
+            </a:pPr>
+            <a:fld id="{9E8EB9F5-F2F7-4A48-A943-9B409357C15C}" type="slidenum">
+              <a:rPr lang="en-US" smtClean="0"/>
+              <a:pPr>
+                <a:defRPr/>
+              </a:pPr>
+              <a:t>11</a:t>
+            </a:fld>
+            <a:endParaRPr lang="en-US"/>
+          </a:p>
+        </p:txBody>
+      </p:sp>
+    </p:spTree>
+    <p:extLst>
+      <p:ext uri="{BB962C8B-B14F-4D97-AF65-F5344CB8AC3E}">
+        <p14:creationId xmlns:p14="http://schemas.microsoft.com/office/powerpoint/2010/main" val="930179752"/>
       </p:ext>
     </p:extLst>
   </p:cSld>
@@ -5578,13 +6486,6 @@
               </a:rPr>
               <a:t>Toutes les classes </a:t>
             </a:r>
-            <a:r>
-              <a:rPr lang="fr-FR" sz="6000" dirty="0" smtClean="0">
-                <a:latin typeface="Calibri" panose="020F0502020204030204" pitchFamily="34" charset="0"/>
-                <a:cs typeface="Courier New" panose="02070309020205020404" pitchFamily="49" charset="0"/>
-              </a:rPr>
-              <a:t/>
-            </a:r>
             <a:br>
               <a:rPr lang="fr-FR" sz="6000" dirty="0" smtClean="0">
                 <a:latin typeface="Calibri" panose="020F0502020204030204" pitchFamily="34" charset="0"/>
@@ -5596,14 +6497,7 @@
                 <a:latin typeface="Calibri" panose="020F0502020204030204" pitchFamily="34" charset="0"/>
                 <a:cs typeface="Courier New" panose="02070309020205020404" pitchFamily="49" charset="0"/>
               </a:rPr>
-              <a:t>héritent </a:t>
-            </a:r>
-            <a:r>
-              <a:rPr lang="fr-FR" sz="6000" dirty="0" smtClean="0">
-                <a:latin typeface="Calibri" panose="020F0502020204030204" pitchFamily="34" charset="0"/>
-                <a:cs typeface="Courier New" panose="02070309020205020404" pitchFamily="49" charset="0"/>
-              </a:rPr>
-              <a:t>de </a:t>
+              <a:t>héritent de </a:t>
             </a:r>
             <a:r>
               <a:rPr lang="fr-FR" sz="6000" dirty="0" err="1" smtClean="0">
@@ -5670,8 +6564,8 @@
         </p:nvSpPr>
         <p:spPr>
           <a:xfrm>
-            <a:off x="401444" y="780585"/>
-            <a:ext cx="11508058" cy="1015663"/>
+            <a:off x="401443" y="689145"/>
+            <a:ext cx="11790557" cy="6278642"/>
           </a:xfrm>
           <a:prstGeom prst="rect">
             <a:avLst/>
@@ -5684,14 +6578,71 @@
           </a:bodyPr>
           <a:lstStyle/>
           <a:p>
+            <a:pPr marL="857250" indent="-857250">
+              <a:buFont typeface="Arial" panose="020B0604020202020204" pitchFamily="34" charset="0"/>
+              <a:buChar char="•"/>
+            </a:pPr>
             <a:r>
               <a:rPr lang="fr-FR" sz="6000" dirty="0" smtClean="0">
                 <a:latin typeface="Calibri" panose="020F0502020204030204" pitchFamily="34" charset="0"/>
-              </a:rPr>
-              <a:t>Quel lien entre </a:t>
+                <a:cs typeface="Courier New" panose="02070309020205020404" pitchFamily="49" charset="0"/>
+              </a:rPr>
+              <a:t>On appelle </a:t>
+            </a:r>
+            <a:r>
+              <a:rPr lang="fr-FR" sz="6000" i="1" dirty="0" smtClean="0">
+                <a:latin typeface="Calibri" panose="020F0502020204030204" pitchFamily="34" charset="0"/>
+                <a:cs typeface="Courier New" panose="02070309020205020404" pitchFamily="49" charset="0"/>
+              </a:rPr>
+              <a:t>classe</a:t>
             </a:r>
             <a:r>
               <a:rPr lang="fr-FR" sz="6000" dirty="0" smtClean="0">
+                <a:latin typeface="Calibri" panose="020F0502020204030204" pitchFamily="34" charset="0"/>
+                <a:cs typeface="Courier New" panose="02070309020205020404" pitchFamily="49" charset="0"/>
+              </a:rPr>
+              <a:t> ou </a:t>
+            </a:r>
+            <a:r>
+              <a:rPr lang="fr-FR" sz="6000" i="1" dirty="0" smtClean="0">
+                <a:latin typeface="Calibri" panose="020F0502020204030204" pitchFamily="34" charset="0"/>
+                <a:cs typeface="Courier New" panose="02070309020205020404" pitchFamily="49" charset="0"/>
+              </a:rPr>
+              <a:t>type</a:t>
+            </a:r>
+            <a:r>
+              <a:rPr lang="fr-FR" sz="6000" dirty="0" smtClean="0">
+                <a:latin typeface="Calibri" panose="020F0502020204030204" pitchFamily="34" charset="0"/>
+                <a:cs typeface="Courier New" panose="02070309020205020404" pitchFamily="49" charset="0"/>
+              </a:rPr>
+              <a:t> une instance de la </a:t>
+            </a:r>
+            <a:r>
+              <a:rPr lang="fr-FR" sz="6000" dirty="0" err="1" smtClean="0">
+                <a:latin typeface="Calibri" panose="020F0502020204030204" pitchFamily="34" charset="0"/>
+                <a:cs typeface="Courier New" panose="02070309020205020404" pitchFamily="49" charset="0"/>
+              </a:rPr>
+              <a:t>métaclasse</a:t>
+            </a:r>
+            <a:endParaRPr lang="fr-FR" sz="6000" dirty="0" smtClean="0">
+              <a:latin typeface="Calibri" panose="020F0502020204030204" pitchFamily="34" charset="0"/>
+              <a:cs typeface="Courier New" panose="02070309020205020404" pitchFamily="49" charset="0"/>
+            </a:endParaRPr>
+          </a:p>
+          <a:p>
+            <a:pPr marL="1314450" lvl="1" indent="-857250">
+              <a:buFont typeface="Arial" panose="020B0604020202020204" pitchFamily="34" charset="0"/>
+              <a:buChar char="•"/>
+            </a:pPr>
+            <a:r>
+              <a:rPr lang="fr-FR" sz="5400" dirty="0" smtClean="0">
+                <a:latin typeface="Calibri" panose="020F0502020204030204" pitchFamily="34" charset="0"/>
+                <a:cs typeface="Courier New" panose="02070309020205020404" pitchFamily="49" charset="0"/>
+              </a:rPr>
+              <a:t>La classe a pour type l’objet </a:t>
+            </a:r>
+            <a:r>
+              <a:rPr lang="fr-FR" sz="5400" dirty="0" smtClean="0">
                 <a:solidFill>
                   <a:srgbClr val="00B050"/>
                 </a:solidFill>
@@ -5700,59 +6651,77 @@
               </a:rPr>
               <a:t>type</a:t>
             </a:r>
+            <a:endParaRPr lang="fr-FR" sz="5400" dirty="0" smtClean="0">
+              <a:solidFill>
+                <a:srgbClr val="00B050"/>
+              </a:solidFill>
+              <a:latin typeface="Courier New" panose="02070309020205020404" pitchFamily="49" charset="0"/>
+              <a:cs typeface="Courier New" panose="02070309020205020404" pitchFamily="49" charset="0"/>
+            </a:endParaRPr>
+          </a:p>
+          <a:p>
+            <a:pPr marL="857250" indent="-857250">
+              <a:buFont typeface="Arial" panose="020B0604020202020204" pitchFamily="34" charset="0"/>
+              <a:buChar char="•"/>
+            </a:pPr>
             <a:r>
               <a:rPr lang="fr-FR" sz="6000" dirty="0" smtClean="0">
+                <a:latin typeface="Calibri" panose="020F0502020204030204" pitchFamily="34" charset="0"/>
+                <a:cs typeface="Courier New" panose="02070309020205020404" pitchFamily="49" charset="0"/>
+              </a:rPr>
+              <a:t>On appelle </a:t>
+            </a:r>
+            <a:r>
+              <a:rPr lang="fr-FR" sz="6000" i="1" dirty="0" smtClean="0">
+                <a:latin typeface="Calibri" panose="020F0502020204030204" pitchFamily="34" charset="0"/>
+                <a:cs typeface="Courier New" panose="02070309020205020404" pitchFamily="49" charset="0"/>
+              </a:rPr>
+              <a:t>instance</a:t>
+            </a:r>
+            <a:r>
+              <a:rPr lang="fr-FR" sz="6000" dirty="0" smtClean="0">
+                <a:latin typeface="Calibri" panose="020F0502020204030204" pitchFamily="34" charset="0"/>
+                <a:cs typeface="Courier New" panose="02070309020205020404" pitchFamily="49" charset="0"/>
+              </a:rPr>
+              <a:t> une instance d’une classe</a:t>
+            </a:r>
+          </a:p>
+          <a:p>
+            <a:pPr marL="1314450" lvl="1" indent="-857250">
+              <a:buFont typeface="Arial" panose="020B0604020202020204" pitchFamily="34" charset="0"/>
+              <a:buChar char="•"/>
+            </a:pPr>
+            <a:r>
+              <a:rPr lang="fr-FR" sz="5400" dirty="0" smtClean="0">
+                <a:latin typeface="Calibri" panose="020F0502020204030204" pitchFamily="34" charset="0"/>
+                <a:cs typeface="Courier New" panose="02070309020205020404" pitchFamily="49" charset="0"/>
+              </a:rPr>
+              <a:t>Une instance n’a pas pour type l’objet </a:t>
+            </a:r>
+            <a:r>
+              <a:rPr lang="fr-FR" sz="5400" dirty="0" smtClean="0">
                 <a:solidFill>
                   <a:srgbClr val="00B050"/>
                 </a:solidFill>
+                <a:latin typeface="Courier New" panose="02070309020205020404" pitchFamily="49" charset="0"/>
+                <a:cs typeface="Courier New" panose="02070309020205020404" pitchFamily="49" charset="0"/>
+              </a:rPr>
+              <a:t>type</a:t>
+            </a:r>
+            <a:r>
+              <a:rPr lang="fr-FR" sz="5400" dirty="0" smtClean="0">
                 <a:latin typeface="Calibri" panose="020F0502020204030204" pitchFamily="34" charset="0"/>
-              </a:rPr>
-              <a:t> </a:t>
-            </a:r>
-            <a:r>
-              <a:rPr lang="fr-FR" sz="6000" dirty="0" smtClean="0">
-                <a:latin typeface="Calibri" panose="020F0502020204030204" pitchFamily="34" charset="0"/>
-              </a:rPr>
-              <a:t>et </a:t>
-            </a:r>
-            <a:r>
-              <a:rPr lang="fr-FR" sz="6000" dirty="0" err="1" smtClean="0">
-                <a:solidFill>
-                  <a:srgbClr val="FF0000"/>
-                </a:solidFill>
-                <a:latin typeface="Courier New" panose="02070309020205020404" pitchFamily="49" charset="0"/>
-                <a:cs typeface="Courier New" panose="02070309020205020404" pitchFamily="49" charset="0"/>
-              </a:rPr>
-              <a:t>object</a:t>
-            </a:r>
-            <a:r>
-              <a:rPr lang="fr-FR" sz="6000" dirty="0" smtClean="0">
-                <a:solidFill>
-                  <a:srgbClr val="FF0000"/>
-                </a:solidFill>
-                <a:latin typeface="Courier New" panose="02070309020205020404" pitchFamily="49" charset="0"/>
-                <a:cs typeface="Courier New" panose="02070309020205020404" pitchFamily="49" charset="0"/>
-              </a:rPr>
-              <a:t> </a:t>
-            </a:r>
-            <a:r>
-              <a:rPr lang="fr-FR" sz="6000" dirty="0" smtClean="0">
-                <a:latin typeface="Calibri" panose="020F0502020204030204" pitchFamily="34" charset="0"/>
-                <a:cs typeface="Courier New" panose="02070309020205020404" pitchFamily="49" charset="0"/>
-              </a:rPr>
-              <a:t>?</a:t>
-            </a:r>
-            <a:endParaRPr lang="fr-FR" sz="6000" dirty="0">
-              <a:latin typeface="Calibri" panose="020F0502020204030204" pitchFamily="34" charset="0"/>
-              <a:cs typeface="Courier New" panose="02070309020205020404" pitchFamily="49" charset="0"/>
-            </a:endParaRPr>
+                <a:cs typeface="Courier New" panose="02070309020205020404" pitchFamily="49" charset="0"/>
+              </a:rPr>
+              <a:t>, mais l’objet classe</a:t>
+            </a:r>
           </a:p>
         </p:txBody>
       </p:sp>
     </p:spTree>
     <p:extLst>
       <p:ext uri="{BB962C8B-B14F-4D97-AF65-F5344CB8AC3E}">
-        <p14:creationId xmlns:p14="http://schemas.microsoft.com/office/powerpoint/2010/main" val="362375951"/>
+        <p14:creationId xmlns:p14="http://schemas.microsoft.com/office/powerpoint/2010/main" val="3313412852"/>
       </p:ext>
     </p:extLst>
   </p:cSld>
@@ -5788,6 +6757,233 @@
       </p:grpSpPr>
       <p:sp>
         <p:nvSpPr>
+          <p:cNvPr id="5" name="ZoneTexte 4"/>
+          <p:cNvSpPr txBox="1"/>
+          <p:nvPr/>
+        </p:nvSpPr>
+        <p:spPr>
+          <a:xfrm>
+            <a:off x="401443" y="780585"/>
+            <a:ext cx="11790557" cy="3785652"/>
+          </a:xfrm>
+          <a:prstGeom prst="rect">
+            <a:avLst/>
+          </a:prstGeom>
+          <a:noFill/>
+        </p:spPr>
+        <p:txBody>
+          <a:bodyPr wrap="square" rtlCol="0">
+            <a:spAutoFit/>
+          </a:bodyPr>
+          <a:lstStyle/>
+          <a:p>
+            <a:pPr marL="857250" indent="-857250">
+              <a:buFont typeface="Arial" panose="020B0604020202020204" pitchFamily="34" charset="0"/>
+              <a:buChar char="•"/>
+            </a:pPr>
+            <a:r>
+              <a:rPr lang="fr-FR" sz="6000" dirty="0" smtClean="0">
+                <a:latin typeface="Calibri" panose="020F0502020204030204" pitchFamily="34" charset="0"/>
+                <a:cs typeface="Courier New" panose="02070309020205020404" pitchFamily="49" charset="0"/>
+              </a:rPr>
+              <a:t>Les </a:t>
+            </a:r>
+            <a:r>
+              <a:rPr lang="fr-FR" sz="6000" dirty="0">
+                <a:latin typeface="Calibri" panose="020F0502020204030204" pitchFamily="34" charset="0"/>
+                <a:cs typeface="Courier New" panose="02070309020205020404" pitchFamily="49" charset="0"/>
+              </a:rPr>
+              <a:t>classes peuvent avoir des sous-classes, pas les instances</a:t>
+            </a:r>
+            <a:endParaRPr lang="fr-FR" sz="6000" dirty="0">
+              <a:latin typeface="Calibri" panose="020F0502020204030204" pitchFamily="34" charset="0"/>
+            </a:endParaRPr>
+          </a:p>
+          <a:p>
+            <a:pPr marL="857250" indent="-857250">
+              <a:buFont typeface="Arial" panose="020B0604020202020204" pitchFamily="34" charset="0"/>
+              <a:buChar char="•"/>
+            </a:pPr>
+            <a:r>
+              <a:rPr lang="fr-FR" sz="6000" dirty="0" smtClean="0">
+                <a:latin typeface="Calibri" panose="020F0502020204030204" pitchFamily="34" charset="0"/>
+                <a:cs typeface="Courier New" panose="02070309020205020404" pitchFamily="49" charset="0"/>
+              </a:rPr>
+              <a:t>Les classes peuvent avoir des instances, pas les instances</a:t>
+            </a:r>
+            <a:endParaRPr lang="fr-FR" sz="6000" dirty="0" smtClean="0">
+              <a:solidFill>
+                <a:srgbClr val="FF0000"/>
+              </a:solidFill>
+              <a:latin typeface="Courier New" panose="02070309020205020404" pitchFamily="49" charset="0"/>
+              <a:cs typeface="Courier New" panose="02070309020205020404" pitchFamily="49" charset="0"/>
+            </a:endParaRPr>
+          </a:p>
+        </p:txBody>
+      </p:sp>
+    </p:spTree>
+    <p:extLst>
+      <p:ext uri="{BB962C8B-B14F-4D97-AF65-F5344CB8AC3E}">
+        <p14:creationId xmlns:p14="http://schemas.microsoft.com/office/powerpoint/2010/main" val="2766108600"/>
+      </p:ext>
+    </p:extLst>
+  </p:cSld>
+  <p:clrMapOvr>
+    <a:masterClrMapping/>
+  </p:clrMapOvr>
+  <p:timing>
+    <p:tnLst>
+      <p:par>
+        <p:cTn id="1" dur="indefinite" restart="never" nodeType="tmRoot"/>
+      </p:par>
+    </p:tnLst>
+  </p:timing>
+</p:sld>
+</file>
+
+<file path=ppt/slides/slide13.xml><?xml version="1.0" encoding="utf-8"?>
+<p:sld xmlns:a="http://schemas.openxmlformats.org/drawingml/2006/main" xmlns:r="http://schemas.openxmlformats.org/officeDocument/2006/relationships" xmlns:p="http://schemas.openxmlformats.org/presentationml/2006/main">
+  <p:cSld>
+    <p:spTree>
+      <p:nvGrpSpPr>
+        <p:cNvPr id="1" name=""/>
+        <p:cNvGrpSpPr/>
+        <p:nvPr/>
+      </p:nvGrpSpPr>
+      <p:grpSpPr>
+        <a:xfrm>
+          <a:off x="0" y="0"/>
+          <a:ext cx="0" cy="0"/>
+          <a:chOff x="0" y="0"/>
+          <a:chExt cx="0" cy="0"/>
+        </a:xfrm>
+      </p:grpSpPr>
+      <p:sp>
+        <p:nvSpPr>
+          <p:cNvPr id="5" name="ZoneTexte 4"/>
+          <p:cNvSpPr txBox="1"/>
+          <p:nvPr/>
+        </p:nvSpPr>
+        <p:spPr>
+          <a:xfrm>
+            <a:off x="401444" y="780585"/>
+            <a:ext cx="11508058" cy="1015663"/>
+          </a:xfrm>
+          <a:prstGeom prst="rect">
+            <a:avLst/>
+          </a:prstGeom>
+          <a:noFill/>
+        </p:spPr>
+        <p:txBody>
+          <a:bodyPr wrap="square" rtlCol="0">
+            <a:spAutoFit/>
+          </a:bodyPr>
+          <a:lstStyle/>
+          <a:p>
+            <a:r>
+              <a:rPr lang="fr-FR" sz="6000" dirty="0" smtClean="0">
+                <a:latin typeface="Calibri" panose="020F0502020204030204" pitchFamily="34" charset="0"/>
+              </a:rPr>
+              <a:t>Quel lien entre </a:t>
+            </a:r>
+            <a:r>
+              <a:rPr lang="fr-FR" sz="6000" dirty="0" smtClean="0">
+                <a:solidFill>
+                  <a:srgbClr val="00B050"/>
+                </a:solidFill>
+                <a:latin typeface="Courier New" panose="02070309020205020404" pitchFamily="49" charset="0"/>
+                <a:cs typeface="Courier New" panose="02070309020205020404" pitchFamily="49" charset="0"/>
+              </a:rPr>
+              <a:t>type</a:t>
+            </a:r>
+            <a:r>
+              <a:rPr lang="fr-FR" sz="6000" dirty="0" smtClean="0">
+                <a:solidFill>
+                  <a:srgbClr val="00B050"/>
+                </a:solidFill>
+                <a:latin typeface="Calibri" panose="020F0502020204030204" pitchFamily="34" charset="0"/>
+              </a:rPr>
+              <a:t> </a:t>
+            </a:r>
+            <a:r>
+              <a:rPr lang="fr-FR" sz="6000" dirty="0" smtClean="0">
+                <a:latin typeface="Calibri" panose="020F0502020204030204" pitchFamily="34" charset="0"/>
+              </a:rPr>
+              <a:t>et </a:t>
+            </a:r>
+            <a:r>
+              <a:rPr lang="fr-FR" sz="6000" dirty="0" err="1" smtClean="0">
+                <a:solidFill>
+                  <a:srgbClr val="FF0000"/>
+                </a:solidFill>
+                <a:latin typeface="Courier New" panose="02070309020205020404" pitchFamily="49" charset="0"/>
+                <a:cs typeface="Courier New" panose="02070309020205020404" pitchFamily="49" charset="0"/>
+              </a:rPr>
+              <a:t>object</a:t>
+            </a:r>
+            <a:r>
+              <a:rPr lang="fr-FR" sz="6000" dirty="0" smtClean="0">
+                <a:solidFill>
+                  <a:srgbClr val="FF0000"/>
+                </a:solidFill>
+                <a:latin typeface="Courier New" panose="02070309020205020404" pitchFamily="49" charset="0"/>
+                <a:cs typeface="Courier New" panose="02070309020205020404" pitchFamily="49" charset="0"/>
+              </a:rPr>
+              <a:t> </a:t>
+            </a:r>
+            <a:r>
+              <a:rPr lang="fr-FR" sz="6000" dirty="0" smtClean="0">
+                <a:latin typeface="Calibri" panose="020F0502020204030204" pitchFamily="34" charset="0"/>
+                <a:cs typeface="Courier New" panose="02070309020205020404" pitchFamily="49" charset="0"/>
+              </a:rPr>
+              <a:t>?</a:t>
+            </a:r>
+            <a:endParaRPr lang="fr-FR" sz="6000" dirty="0">
+              <a:latin typeface="Calibri" panose="020F0502020204030204" pitchFamily="34" charset="0"/>
+              <a:cs typeface="Courier New" panose="02070309020205020404" pitchFamily="49" charset="0"/>
+            </a:endParaRPr>
+          </a:p>
+        </p:txBody>
+      </p:sp>
+    </p:spTree>
+    <p:extLst>
+      <p:ext uri="{BB962C8B-B14F-4D97-AF65-F5344CB8AC3E}">
+        <p14:creationId xmlns:p14="http://schemas.microsoft.com/office/powerpoint/2010/main" val="362375951"/>
+      </p:ext>
+    </p:extLst>
+  </p:cSld>
+  <p:clrMapOvr>
+    <a:masterClrMapping/>
+  </p:clrMapOvr>
+  <p:timing>
+    <p:tnLst>
+      <p:par>
+        <p:cTn id="1" dur="indefinite" restart="never" nodeType="tmRoot"/>
+      </p:par>
+    </p:tnLst>
+  </p:timing>
+</p:sld>
+</file>
+
+<file path=ppt/slides/slide14.xml><?xml version="1.0" encoding="utf-8"?>
+<p:sld xmlns:a="http://schemas.openxmlformats.org/drawingml/2006/main" xmlns:r="http://schemas.openxmlformats.org/officeDocument/2006/relationships" xmlns:p="http://schemas.openxmlformats.org/presentationml/2006/main">
+  <p:cSld>
+    <p:spTree>
+      <p:nvGrpSpPr>
+        <p:cNvPr id="1" name=""/>
+        <p:cNvGrpSpPr/>
+        <p:nvPr/>
+      </p:nvGrpSpPr>
+      <p:grpSpPr>
+        <a:xfrm>
+          <a:off x="0" y="0"/>
+          <a:ext cx="0" cy="0"/>
+          <a:chOff x="0" y="0"/>
+          <a:chExt cx="0" cy="0"/>
+        </a:xfrm>
+      </p:grpSpPr>
+      <p:sp>
+        <p:nvSpPr>
           <p:cNvPr id="2" name="Rectangle 1"/>
           <p:cNvSpPr/>
           <p:nvPr/>
@@ -6025,10 +7221,17 @@
                 <a:latin typeface="Courier New" panose="02070309020205020404" pitchFamily="49" charset="0"/>
                 <a:cs typeface="Courier New" panose="02070309020205020404" pitchFamily="49" charset="0"/>
               </a:rPr>
-              <a:t>&lt;type '</a:t>
-            </a:r>
-            <a:r>
-              <a:rPr lang="fr-FR" sz="2800" dirty="0">
+              <a:t>&lt;type </a:t>
+            </a:r>
+            <a:r>
+              <a:rPr lang="fr-FR" sz="2800">
+                <a:latin typeface="Courier New" panose="02070309020205020404" pitchFamily="49" charset="0"/>
+                <a:cs typeface="Courier New" panose="02070309020205020404" pitchFamily="49" charset="0"/>
+              </a:rPr>
+              <a:t>'</a:t>
+            </a:r>
+            <a:r>
+              <a:rPr lang="fr-FR" sz="2800">
                 <a:solidFill>
                   <a:srgbClr val="00B050"/>
                 </a:solidFill>
@@ -6038,7 +7241,7 @@
               <a:t>type</a:t>
             </a:r>
             <a:r>
-              <a:rPr lang="fr-FR" sz="2800" dirty="0">
+              <a:rPr lang="fr-FR" sz="2800" smtClean="0">
                 <a:latin typeface="Courier New" panose="02070309020205020404" pitchFamily="49" charset="0"/>
                 <a:cs typeface="Courier New" panose="02070309020205020404" pitchFamily="49" charset="0"/>
               </a:rPr>
@@ -6047,41 +7250,6 @@
             <a:endParaRPr lang="fr-FR" sz="2800" dirty="0" smtClean="0">
               <a:latin typeface="Courier New" panose="02070309020205020404" pitchFamily="49" charset="0"/>
               <a:cs typeface="Courier New" panose="02070309020205020404" pitchFamily="49" charset="0"/>
-            </a:endParaRPr>
-          </a:p>
-        </p:txBody>
-      </p:sp>
-      <p:sp>
-        <p:nvSpPr>
-          <p:cNvPr id="7" name="ZoneTexte 6"/>
-          <p:cNvSpPr txBox="1"/>
-          <p:nvPr/>
-        </p:nvSpPr>
-        <p:spPr>
-          <a:xfrm>
-            <a:off x="298174" y="291386"/>
-            <a:ext cx="7083286" cy="1323439"/>
-          </a:xfrm>
-          <a:prstGeom prst="rect">
-            <a:avLst/>
-          </a:prstGeom>
-          <a:noFill/>
-        </p:spPr>
-        <p:txBody>
-          <a:bodyPr wrap="square" rtlCol="0">
-            <a:spAutoFit/>
-          </a:bodyPr>
-          <a:lstStyle/>
-          <a:p>
-            <a:r>
-              <a:rPr lang="fr-FR" sz="4000" dirty="0" smtClean="0">
-                <a:latin typeface="Calibri" panose="020F0502020204030204" pitchFamily="34" charset="0"/>
-                <a:cs typeface="Courier New" panose="02070309020205020404" pitchFamily="49" charset="0"/>
-              </a:rPr>
-              <a:t>Les classes peuvent avoir des sous-classes, pas les instances</a:t>
-            </a:r>
-            <a:endParaRPr lang="fr-FR" sz="4000" dirty="0">
-              <a:latin typeface="Calibri" panose="020F0502020204030204" pitchFamily="34" charset="0"/>
             </a:endParaRPr>
           </a:p>
         </p:txBody>

</xml_diff>